<commit_message>
Found 8 possible papers to be researched.
</commit_message>
<xml_diff>
--- a/Slides/Can Deveci.pptx
+++ b/Slides/Can Deveci.pptx
@@ -113,6 +113,11 @@
       </a:defRPr>
     </a:lvl9pPr>
   </p:defaultTextStyle>
+  <p:extLst>
+    <p:ext uri="{EFAFB233-063F-42B5-8137-9DF3F51BA10A}">
+      <p15:sldGuideLst xmlns:p15="http://schemas.microsoft.com/office/powerpoint/2012/main"/>
+    </p:ext>
+  </p:extLst>
 </p:presentation>
 </file>
 
@@ -4508,24 +4513,62 @@
         </p:nvSpPr>
         <p:spPr/>
         <p:txBody>
-          <a:bodyPr/>
+          <a:bodyPr>
+            <a:normAutofit fontScale="92500" lnSpcReduction="20000"/>
+          </a:bodyPr>
           <a:lstStyle/>
           <a:p>
             <a:r>
               <a:rPr lang="en-US" dirty="0"/>
-              <a:t>Paper 1</a:t>
+              <a:t>Keyword: “biomedical entity normalization”</a:t>
             </a:r>
           </a:p>
           <a:p>
             <a:r>
               <a:rPr lang="en-US" dirty="0"/>
-              <a:t>Paper 2</a:t>
+              <a:t>0-An ensemble CNN method for biomedical entity normalization </a:t>
             </a:r>
           </a:p>
           <a:p>
             <a:r>
               <a:rPr lang="en-US" dirty="0"/>
-              <a:t>Paper 3</a:t>
+              <a:t>1-CNN-based ranking for biomedical entity normalization</a:t>
+            </a:r>
+          </a:p>
+          <a:p>
+            <a:r>
+              <a:rPr lang="en-US" dirty="0"/>
+              <a:t>2-NERBio: using selected word conjunctions, term normalization, and global patterns to improve biomedical named entity recognition</a:t>
+            </a:r>
+          </a:p>
+          <a:p>
+            <a:r>
+              <a:rPr lang="en-US" dirty="0"/>
+              <a:t>3-Unsupervised gene/protein named entity normalization using automatically extracted dictionaries </a:t>
+            </a:r>
+          </a:p>
+          <a:p>
+            <a:r>
+              <a:rPr lang="en-US" dirty="0"/>
+              <a:t>4-OrganismTagger: detection, normalization and grounding of organism entities in biomedical documents</a:t>
+            </a:r>
+          </a:p>
+          <a:p>
+            <a:r>
+              <a:rPr lang="en-US" dirty="0"/>
+              <a:t>5-Normalizing biomedical terms by minimizing ambiguity and variability</a:t>
+            </a:r>
+          </a:p>
+          <a:p>
+            <a:r>
+              <a:rPr lang="en-US" dirty="0"/>
+              <a:t>6-A method for named entity normalization in biomedical articles: application to diseases and plants</a:t>
+            </a:r>
+          </a:p>
+          <a:p>
+            <a:r>
+              <a:rPr lang="en-US" dirty="0"/>
+              <a:t>7-DNorm: disease name normalization with pairwise learning to rank</a:t>
             </a:r>
           </a:p>
         </p:txBody>

</xml_diff>

<commit_message>
Added references for Habitats domain.
</commit_message>
<xml_diff>
--- a/Slides/Can Deveci.pptx
+++ b/Slides/Can Deveci.pptx
@@ -13,8 +13,10 @@
     <p:sldId id="266" r:id="rId7"/>
     <p:sldId id="257" r:id="rId8"/>
     <p:sldId id="258" r:id="rId9"/>
-    <p:sldId id="259" r:id="rId10"/>
-    <p:sldId id="260" r:id="rId11"/>
+    <p:sldId id="268" r:id="rId10"/>
+    <p:sldId id="267" r:id="rId11"/>
+    <p:sldId id="259" r:id="rId12"/>
+    <p:sldId id="260" r:id="rId13"/>
   </p:sldIdLst>
   <p:sldSz cx="12192000" cy="6858000"/>
   <p:notesSz cx="6858000" cy="9144000"/>
@@ -3973,6 +3975,192 @@
           <a:p>
             <a:r>
               <a:rPr lang="en-US" dirty="0"/>
+              <a:t>Paper 1</a:t>
+            </a:r>
+          </a:p>
+        </p:txBody>
+      </p:sp>
+      <p:sp>
+        <p:nvSpPr>
+          <p:cNvPr id="3" name="Content Placeholder 2">
+            <a:extLst>
+              <a:ext uri="{FF2B5EF4-FFF2-40B4-BE49-F238E27FC236}">
+                <a16:creationId xmlns:a16="http://schemas.microsoft.com/office/drawing/2014/main" id="{3B9B51B1-383B-4A8B-9C5B-9FD704B0BC1B}"/>
+              </a:ext>
+            </a:extLst>
+          </p:cNvPr>
+          <p:cNvSpPr>
+            <a:spLocks noGrp="1"/>
+          </p:cNvSpPr>
+          <p:nvPr>
+            <p:ph idx="1"/>
+          </p:nvPr>
+        </p:nvSpPr>
+        <p:spPr/>
+        <p:txBody>
+          <a:bodyPr/>
+          <a:lstStyle/>
+          <a:p>
+            <a:r>
+              <a:rPr lang="en-US" dirty="0"/>
+              <a:t>5 Key Ideas that can be </a:t>
+            </a:r>
+            <a:r>
+              <a:rPr lang="en-US" dirty="0" err="1"/>
+              <a:t>exploitet</a:t>
+            </a:r>
+            <a:r>
+              <a:rPr lang="en-US" dirty="0"/>
+              <a:t> from 5 Papers</a:t>
+            </a:r>
+          </a:p>
+          <a:p>
+            <a:endParaRPr lang="en-US" dirty="0"/>
+          </a:p>
+          <a:p>
+            <a:r>
+              <a:rPr lang="en-US" dirty="0"/>
+              <a:t>Accounted practical aspects/ease of implementation in ranking</a:t>
+            </a:r>
+          </a:p>
+        </p:txBody>
+      </p:sp>
+    </p:spTree>
+    <p:extLst>
+      <p:ext uri="{BB962C8B-B14F-4D97-AF65-F5344CB8AC3E}">
+        <p14:creationId xmlns:p14="http://schemas.microsoft.com/office/powerpoint/2010/main" val="2681154579"/>
+      </p:ext>
+    </p:extLst>
+  </p:cSld>
+  <p:clrMapOvr>
+    <a:masterClrMapping/>
+  </p:clrMapOvr>
+</p:sld>
+</file>
+
+<file path=ppt/slides/slide11.xml><?xml version="1.0" encoding="utf-8"?>
+<p:sld xmlns:a="http://schemas.openxmlformats.org/drawingml/2006/main" xmlns:r="http://schemas.openxmlformats.org/officeDocument/2006/relationships" xmlns:p="http://schemas.openxmlformats.org/presentationml/2006/main">
+  <p:cSld>
+    <p:spTree>
+      <p:nvGrpSpPr>
+        <p:cNvPr id="1" name=""/>
+        <p:cNvGrpSpPr/>
+        <p:nvPr/>
+      </p:nvGrpSpPr>
+      <p:grpSpPr>
+        <a:xfrm>
+          <a:off x="0" y="0"/>
+          <a:ext cx="0" cy="0"/>
+          <a:chOff x="0" y="0"/>
+          <a:chExt cx="0" cy="0"/>
+        </a:xfrm>
+      </p:grpSpPr>
+      <p:sp>
+        <p:nvSpPr>
+          <p:cNvPr id="2" name="Title 1">
+            <a:extLst>
+              <a:ext uri="{FF2B5EF4-FFF2-40B4-BE49-F238E27FC236}">
+                <a16:creationId xmlns:a16="http://schemas.microsoft.com/office/drawing/2014/main" id="{1AE67C95-A1CD-44F8-99D2-4640264C88CA}"/>
+              </a:ext>
+            </a:extLst>
+          </p:cNvPr>
+          <p:cNvSpPr>
+            <a:spLocks noGrp="1"/>
+          </p:cNvSpPr>
+          <p:nvPr>
+            <p:ph type="title"/>
+          </p:nvPr>
+        </p:nvSpPr>
+        <p:spPr/>
+        <p:txBody>
+          <a:bodyPr/>
+          <a:lstStyle/>
+          <a:p>
+            <a:r>
+              <a:rPr lang="en-US" dirty="0"/>
+              <a:t>Paper 2</a:t>
+            </a:r>
+          </a:p>
+        </p:txBody>
+      </p:sp>
+      <p:sp>
+        <p:nvSpPr>
+          <p:cNvPr id="3" name="Content Placeholder 2">
+            <a:extLst>
+              <a:ext uri="{FF2B5EF4-FFF2-40B4-BE49-F238E27FC236}">
+                <a16:creationId xmlns:a16="http://schemas.microsoft.com/office/drawing/2014/main" id="{3B9B51B1-383B-4A8B-9C5B-9FD704B0BC1B}"/>
+              </a:ext>
+            </a:extLst>
+          </p:cNvPr>
+          <p:cNvSpPr>
+            <a:spLocks noGrp="1"/>
+          </p:cNvSpPr>
+          <p:nvPr>
+            <p:ph idx="1"/>
+          </p:nvPr>
+        </p:nvSpPr>
+        <p:spPr/>
+        <p:txBody>
+          <a:bodyPr/>
+          <a:lstStyle/>
+          <a:p>
+            <a:endParaRPr lang="en-US" dirty="0"/>
+          </a:p>
+        </p:txBody>
+      </p:sp>
+    </p:spTree>
+    <p:extLst>
+      <p:ext uri="{BB962C8B-B14F-4D97-AF65-F5344CB8AC3E}">
+        <p14:creationId xmlns:p14="http://schemas.microsoft.com/office/powerpoint/2010/main" val="3961645006"/>
+      </p:ext>
+    </p:extLst>
+  </p:cSld>
+  <p:clrMapOvr>
+    <a:masterClrMapping/>
+  </p:clrMapOvr>
+</p:sld>
+</file>
+
+<file path=ppt/slides/slide12.xml><?xml version="1.0" encoding="utf-8"?>
+<p:sld xmlns:a="http://schemas.openxmlformats.org/drawingml/2006/main" xmlns:r="http://schemas.openxmlformats.org/officeDocument/2006/relationships" xmlns:p="http://schemas.openxmlformats.org/presentationml/2006/main">
+  <p:cSld>
+    <p:spTree>
+      <p:nvGrpSpPr>
+        <p:cNvPr id="1" name=""/>
+        <p:cNvGrpSpPr/>
+        <p:nvPr/>
+      </p:nvGrpSpPr>
+      <p:grpSpPr>
+        <a:xfrm>
+          <a:off x="0" y="0"/>
+          <a:ext cx="0" cy="0"/>
+          <a:chOff x="0" y="0"/>
+          <a:chExt cx="0" cy="0"/>
+        </a:xfrm>
+      </p:grpSpPr>
+      <p:sp>
+        <p:nvSpPr>
+          <p:cNvPr id="2" name="Title 1">
+            <a:extLst>
+              <a:ext uri="{FF2B5EF4-FFF2-40B4-BE49-F238E27FC236}">
+                <a16:creationId xmlns:a16="http://schemas.microsoft.com/office/drawing/2014/main" id="{1AE67C95-A1CD-44F8-99D2-4640264C88CA}"/>
+              </a:ext>
+            </a:extLst>
+          </p:cNvPr>
+          <p:cNvSpPr>
+            <a:spLocks noGrp="1"/>
+          </p:cNvSpPr>
+          <p:nvPr>
+            <p:ph type="title"/>
+          </p:nvPr>
+        </p:nvSpPr>
+        <p:spPr/>
+        <p:txBody>
+          <a:bodyPr/>
+          <a:lstStyle/>
+          <a:p>
+            <a:r>
+              <a:rPr lang="en-US" dirty="0"/>
               <a:t>Paper 3</a:t>
             </a:r>
           </a:p>
@@ -4514,62 +4702,69 @@
         <p:spPr/>
         <p:txBody>
           <a:bodyPr>
-            <a:normAutofit fontScale="92500" lnSpcReduction="20000"/>
+            <a:normAutofit/>
           </a:bodyPr>
           <a:lstStyle/>
           <a:p>
             <a:r>
               <a:rPr lang="en-US" dirty="0"/>
-              <a:t>Keyword: “biomedical entity normalization”</a:t>
-            </a:r>
+              <a:t>Researched Biomedical Domain NER Papers List</a:t>
+            </a:r>
+          </a:p>
+          <a:p>
+            <a:endParaRPr lang="en-US" dirty="0"/>
           </a:p>
           <a:p>
             <a:r>
               <a:rPr lang="en-US" dirty="0"/>
-              <a:t>0-An ensemble CNN method for biomedical entity normalization </a:t>
-            </a:r>
+              <a:t>Researched Habitats Domain NER Papers List</a:t>
+            </a:r>
+          </a:p>
+          <a:p>
+            <a:endParaRPr lang="en-US" dirty="0"/>
           </a:p>
           <a:p>
             <a:r>
               <a:rPr lang="en-US" dirty="0"/>
-              <a:t>1-CNN-based ranking for biomedical entity normalization</a:t>
-            </a:r>
-          </a:p>
-          <a:p>
+              <a:t>Fused List</a:t>
+            </a:r>
+          </a:p>
+          <a:p>
+            <a:pPr lvl="1"/>
             <a:r>
               <a:rPr lang="en-US" dirty="0"/>
-              <a:t>2-NERBio: using selected word conjunctions, term normalization, and global patterns to improve biomedical named entity recognition</a:t>
-            </a:r>
-          </a:p>
-          <a:p>
+              <a:t>Ease in Implementation</a:t>
+            </a:r>
+          </a:p>
+          <a:p>
+            <a:pPr lvl="1"/>
             <a:r>
               <a:rPr lang="en-US" dirty="0"/>
-              <a:t>3-Unsupervised gene/protein named entity normalization using automatically extracted dictionaries </a:t>
-            </a:r>
-          </a:p>
-          <a:p>
-            <a:r>
-              <a:rPr lang="en-US" dirty="0"/>
-              <a:t>4-OrganismTagger: detection, normalization and grounding of organism entities in biomedical documents</a:t>
-            </a:r>
-          </a:p>
-          <a:p>
-            <a:r>
-              <a:rPr lang="en-US" dirty="0"/>
-              <a:t>5-Normalizing biomedical terms by minimizing ambiguity and variability</a:t>
-            </a:r>
-          </a:p>
-          <a:p>
-            <a:r>
-              <a:rPr lang="en-US" dirty="0"/>
-              <a:t>6-A method for named entity normalization in biomedical articles: application to diseases and plants</a:t>
-            </a:r>
-          </a:p>
-          <a:p>
-            <a:r>
-              <a:rPr lang="en-US" dirty="0"/>
-              <a:t>7-DNorm: disease name normalization with pairwise learning to rank</a:t>
-            </a:r>
+              <a:t>Computational Concerns</a:t>
+            </a:r>
+          </a:p>
+          <a:p>
+            <a:pPr lvl="1"/>
+            <a:r>
+              <a:rPr lang="en-US"/>
+              <a:t>Closeness</a:t>
+            </a:r>
+            <a:endParaRPr lang="en-US" dirty="0"/>
+          </a:p>
+          <a:p>
+            <a:endParaRPr lang="en-US" dirty="0"/>
+          </a:p>
+          <a:p>
+            <a:endParaRPr lang="en-US" dirty="0"/>
+          </a:p>
+          <a:p>
+            <a:endParaRPr lang="en-US" dirty="0"/>
+          </a:p>
+          <a:p>
+            <a:pPr marL="0" indent="0">
+              <a:buNone/>
+            </a:pPr>
+            <a:endParaRPr lang="en-US" dirty="0"/>
           </a:p>
         </p:txBody>
       </p:sp>
@@ -4626,7 +4821,7 @@
           <a:p>
             <a:r>
               <a:rPr lang="en-US" dirty="0"/>
-              <a:t>Paper 1</a:t>
+              <a:t>Biomedical Domain NER Papers</a:t>
             </a:r>
           </a:p>
         </p:txBody>
@@ -4649,8 +4844,64 @@
         </p:nvSpPr>
         <p:spPr/>
         <p:txBody>
-          <a:bodyPr/>
-          <a:lstStyle/>
+          <a:bodyPr>
+            <a:normAutofit fontScale="92500" lnSpcReduction="20000"/>
+          </a:bodyPr>
+          <a:lstStyle/>
+          <a:p>
+            <a:r>
+              <a:rPr lang="en-US" dirty="0"/>
+              <a:t>Keyword: “biomedical entity normalization”</a:t>
+            </a:r>
+          </a:p>
+          <a:p>
+            <a:r>
+              <a:rPr lang="en-US" dirty="0"/>
+              <a:t>0-An ensemble CNN method for biomedical entity normalization </a:t>
+            </a:r>
+          </a:p>
+          <a:p>
+            <a:r>
+              <a:rPr lang="en-US" dirty="0"/>
+              <a:t>1-CNN-based ranking for biomedical entity normalization</a:t>
+            </a:r>
+          </a:p>
+          <a:p>
+            <a:r>
+              <a:rPr lang="en-US" dirty="0"/>
+              <a:t>2-NERBio: using selected word conjunctions, term normalization, and global patterns to improve biomedical named entity recognition</a:t>
+            </a:r>
+          </a:p>
+          <a:p>
+            <a:r>
+              <a:rPr lang="en-US" dirty="0"/>
+              <a:t>3-Unsupervised gene/protein named entity normalization using automatically extracted dictionaries </a:t>
+            </a:r>
+          </a:p>
+          <a:p>
+            <a:r>
+              <a:rPr lang="en-US" dirty="0"/>
+              <a:t>4-OrganismTagger: detection, normalization and grounding of organism entities in biomedical documents</a:t>
+            </a:r>
+          </a:p>
+          <a:p>
+            <a:r>
+              <a:rPr lang="en-US" dirty="0"/>
+              <a:t>5-Normalizing biomedical terms by minimizing ambiguity and variability</a:t>
+            </a:r>
+          </a:p>
+          <a:p>
+            <a:r>
+              <a:rPr lang="en-US" dirty="0"/>
+              <a:t>6-A method for named entity normalization in biomedical articles: application to diseases and plants</a:t>
+            </a:r>
+          </a:p>
+          <a:p>
+            <a:r>
+              <a:rPr lang="en-US" dirty="0"/>
+              <a:t>7-DNorm: disease name normalization with pairwise learning to rank</a:t>
+            </a:r>
+          </a:p>
           <a:p>
             <a:endParaRPr lang="en-US" dirty="0"/>
           </a:p>
@@ -4709,7 +4960,7 @@
           <a:p>
             <a:r>
               <a:rPr lang="en-US" dirty="0"/>
-              <a:t>Paper 2</a:t>
+              <a:t>Habitats Domain NER Papers</a:t>
             </a:r>
           </a:p>
         </p:txBody>
@@ -4742,7 +4993,7 @@
     </p:spTree>
     <p:extLst>
       <p:ext uri="{BB962C8B-B14F-4D97-AF65-F5344CB8AC3E}">
-        <p14:creationId xmlns:p14="http://schemas.microsoft.com/office/powerpoint/2010/main" val="3961645006"/>
+        <p14:creationId xmlns:p14="http://schemas.microsoft.com/office/powerpoint/2010/main" val="3253675657"/>
       </p:ext>
     </p:extLst>
   </p:cSld>

</xml_diff>